<commit_message>
Updating Tableau files and Ppt file.
</commit_message>
<xml_diff>
--- a/NBA Project PPT.pptx
+++ b/NBA Project PPT.pptx
@@ -5,7 +5,7 @@
     <p:sldMasterId id="2147483648" r:id="rId1"/>
   </p:sldMasterIdLst>
   <p:notesMasterIdLst>
-    <p:notesMasterId r:id="rId20"/>
+    <p:notesMasterId r:id="rId21"/>
   </p:notesMasterIdLst>
   <p:sldIdLst>
     <p:sldId id="256" r:id="rId2"/>
@@ -23,9 +23,10 @@
     <p:sldId id="269" r:id="rId14"/>
     <p:sldId id="270" r:id="rId15"/>
     <p:sldId id="274" r:id="rId16"/>
-    <p:sldId id="272" r:id="rId17"/>
-    <p:sldId id="273" r:id="rId18"/>
-    <p:sldId id="271" r:id="rId19"/>
+    <p:sldId id="275" r:id="rId17"/>
+    <p:sldId id="272" r:id="rId18"/>
+    <p:sldId id="273" r:id="rId19"/>
+    <p:sldId id="271" r:id="rId20"/>
   </p:sldIdLst>
   <p:sldSz cx="12192000" cy="6858000"/>
   <p:notesSz cx="6858000" cy="9144000"/>
@@ -132,6 +133,97 @@
 </p:presentation>
 </file>
 
+<file path=ppt/changesInfos/changesInfo1.xml><?xml version="1.0" encoding="utf-8"?>
+<pc:chgInfo xmlns:a="http://schemas.openxmlformats.org/drawingml/2006/main" xmlns:r="http://schemas.openxmlformats.org/officeDocument/2006/relationships" xmlns:ac="http://schemas.microsoft.com/office/drawing/2013/main/command" xmlns:pc="http://schemas.microsoft.com/office/powerpoint/2013/main/command">
+  <pc:docChgLst>
+    <pc:chgData name="Sri Hari Priya Maringanti" userId="ecba00ba1504044b" providerId="LiveId" clId="{6904643D-C312-4FD0-A194-7AD86DB35526}"/>
+    <pc:docChg chg="custSel addSld modSld">
+      <pc:chgData name="Sri Hari Priya Maringanti" userId="ecba00ba1504044b" providerId="LiveId" clId="{6904643D-C312-4FD0-A194-7AD86DB35526}" dt="2023-06-13T17:01:37.993" v="33" actId="20577"/>
+      <pc:docMkLst>
+        <pc:docMk/>
+      </pc:docMkLst>
+      <pc:sldChg chg="addSp delSp mod">
+        <pc:chgData name="Sri Hari Priya Maringanti" userId="ecba00ba1504044b" providerId="LiveId" clId="{6904643D-C312-4FD0-A194-7AD86DB35526}" dt="2023-06-13T17:00:02.791" v="4" actId="22"/>
+        <pc:sldMkLst>
+          <pc:docMk/>
+          <pc:sldMk cId="849832236" sldId="270"/>
+        </pc:sldMkLst>
+        <pc:picChg chg="add">
+          <ac:chgData name="Sri Hari Priya Maringanti" userId="ecba00ba1504044b" providerId="LiveId" clId="{6904643D-C312-4FD0-A194-7AD86DB35526}" dt="2023-06-13T17:00:02.791" v="4" actId="22"/>
+          <ac:picMkLst>
+            <pc:docMk/>
+            <pc:sldMk cId="849832236" sldId="270"/>
+            <ac:picMk id="5" creationId="{232685E6-A9AC-3F92-70D4-EA0195F3EE3E}"/>
+          </ac:picMkLst>
+        </pc:picChg>
+        <pc:picChg chg="del">
+          <ac:chgData name="Sri Hari Priya Maringanti" userId="ecba00ba1504044b" providerId="LiveId" clId="{6904643D-C312-4FD0-A194-7AD86DB35526}" dt="2023-06-13T16:58:41.650" v="0" actId="478"/>
+          <ac:picMkLst>
+            <pc:docMk/>
+            <pc:sldMk cId="849832236" sldId="270"/>
+            <ac:picMk id="6" creationId="{EEAA6E70-1D92-36AE-9BAA-BB5580A197BF}"/>
+          </ac:picMkLst>
+        </pc:picChg>
+      </pc:sldChg>
+      <pc:sldChg chg="addSp delSp mod">
+        <pc:chgData name="Sri Hari Priya Maringanti" userId="ecba00ba1504044b" providerId="LiveId" clId="{6904643D-C312-4FD0-A194-7AD86DB35526}" dt="2023-06-13T17:00:37.444" v="5" actId="22"/>
+        <pc:sldMkLst>
+          <pc:docMk/>
+          <pc:sldMk cId="3916664619" sldId="274"/>
+        </pc:sldMkLst>
+        <pc:picChg chg="add">
+          <ac:chgData name="Sri Hari Priya Maringanti" userId="ecba00ba1504044b" providerId="LiveId" clId="{6904643D-C312-4FD0-A194-7AD86DB35526}" dt="2023-06-13T17:00:37.444" v="5" actId="22"/>
+          <ac:picMkLst>
+            <pc:docMk/>
+            <pc:sldMk cId="3916664619" sldId="274"/>
+            <ac:picMk id="5" creationId="{27956B32-8098-1A84-5E43-C5CFCD3C8F6B}"/>
+          </ac:picMkLst>
+        </pc:picChg>
+        <pc:picChg chg="del">
+          <ac:chgData name="Sri Hari Priya Maringanti" userId="ecba00ba1504044b" providerId="LiveId" clId="{6904643D-C312-4FD0-A194-7AD86DB35526}" dt="2023-06-13T16:58:52.275" v="2" actId="478"/>
+          <ac:picMkLst>
+            <pc:docMk/>
+            <pc:sldMk cId="3916664619" sldId="274"/>
+            <ac:picMk id="6" creationId="{EEAA6E70-1D92-36AE-9BAA-BB5580A197BF}"/>
+          </ac:picMkLst>
+        </pc:picChg>
+      </pc:sldChg>
+      <pc:sldChg chg="addSp delSp modSp add mod">
+        <pc:chgData name="Sri Hari Priya Maringanti" userId="ecba00ba1504044b" providerId="LiveId" clId="{6904643D-C312-4FD0-A194-7AD86DB35526}" dt="2023-06-13T17:01:37.993" v="33" actId="20577"/>
+        <pc:sldMkLst>
+          <pc:docMk/>
+          <pc:sldMk cId="2356194855" sldId="275"/>
+        </pc:sldMkLst>
+        <pc:spChg chg="mod">
+          <ac:chgData name="Sri Hari Priya Maringanti" userId="ecba00ba1504044b" providerId="LiveId" clId="{6904643D-C312-4FD0-A194-7AD86DB35526}" dt="2023-06-13T17:01:37.993" v="33" actId="20577"/>
+          <ac:spMkLst>
+            <pc:docMk/>
+            <pc:sldMk cId="2356194855" sldId="275"/>
+            <ac:spMk id="2" creationId="{DC32C837-27EB-8654-3685-5DF85A1D0AF6}"/>
+          </ac:spMkLst>
+        </pc:spChg>
+        <pc:picChg chg="add">
+          <ac:chgData name="Sri Hari Priya Maringanti" userId="ecba00ba1504044b" providerId="LiveId" clId="{6904643D-C312-4FD0-A194-7AD86DB35526}" dt="2023-06-13T17:01:24.410" v="6" actId="22"/>
+          <ac:picMkLst>
+            <pc:docMk/>
+            <pc:sldMk cId="2356194855" sldId="275"/>
+            <ac:picMk id="5" creationId="{C02216F5-DE72-ACF7-9DD3-0923450AC648}"/>
+          </ac:picMkLst>
+        </pc:picChg>
+        <pc:picChg chg="del">
+          <ac:chgData name="Sri Hari Priya Maringanti" userId="ecba00ba1504044b" providerId="LiveId" clId="{6904643D-C312-4FD0-A194-7AD86DB35526}" dt="2023-06-13T16:58:55.553" v="3" actId="478"/>
+          <ac:picMkLst>
+            <pc:docMk/>
+            <pc:sldMk cId="2356194855" sldId="275"/>
+            <ac:picMk id="6" creationId="{EEAA6E70-1D92-36AE-9BAA-BB5580A197BF}"/>
+          </ac:picMkLst>
+        </pc:picChg>
+      </pc:sldChg>
+    </pc:docChg>
+  </pc:docChgLst>
+</pc:chgInfo>
+</file>
+
 <file path=ppt/notesMasters/notesMaster1.xml><?xml version="1.0" encoding="utf-8"?>
 <p:notesMaster xmlns:a="http://schemas.openxmlformats.org/drawingml/2006/main" xmlns:r="http://schemas.openxmlformats.org/officeDocument/2006/relationships" xmlns:p="http://schemas.openxmlformats.org/presentationml/2006/main">
   <p:cSld>
@@ -214,7 +306,7 @@
           <a:p>
             <a:fld id="{1CD2E782-559B-1145-BB8F-F00F2288B1D3}" type="datetimeFigureOut">
               <a:rPr lang="en-US" smtClean="0"/>
-              <a:t>6/13/23</a:t>
+              <a:t>6/13/2023</a:t>
             </a:fld>
             <a:endParaRPr lang="en-US"/>
           </a:p>
@@ -818,6 +910,90 @@
 </p:notes>
 </file>
 
+<file path=ppt/notesSlides/notesSlide5.xml><?xml version="1.0" encoding="utf-8"?>
+<p:notes xmlns:a="http://schemas.openxmlformats.org/drawingml/2006/main" xmlns:r="http://schemas.openxmlformats.org/officeDocument/2006/relationships" xmlns:p="http://schemas.openxmlformats.org/presentationml/2006/main">
+  <p:cSld>
+    <p:spTree>
+      <p:nvGrpSpPr>
+        <p:cNvPr id="1" name=""/>
+        <p:cNvGrpSpPr/>
+        <p:nvPr/>
+      </p:nvGrpSpPr>
+      <p:grpSpPr>
+        <a:xfrm>
+          <a:off x="0" y="0"/>
+          <a:ext cx="0" cy="0"/>
+          <a:chOff x="0" y="0"/>
+          <a:chExt cx="0" cy="0"/>
+        </a:xfrm>
+      </p:grpSpPr>
+      <p:sp>
+        <p:nvSpPr>
+          <p:cNvPr id="2" name="Slide Image Placeholder 1"/>
+          <p:cNvSpPr>
+            <a:spLocks noGrp="1" noRot="1" noChangeAspect="1"/>
+          </p:cNvSpPr>
+          <p:nvPr>
+            <p:ph type="sldImg"/>
+          </p:nvPr>
+        </p:nvSpPr>
+        <p:spPr/>
+      </p:sp>
+      <p:sp>
+        <p:nvSpPr>
+          <p:cNvPr id="3" name="Notes Placeholder 2"/>
+          <p:cNvSpPr>
+            <a:spLocks noGrp="1"/>
+          </p:cNvSpPr>
+          <p:nvPr>
+            <p:ph type="body" idx="1"/>
+          </p:nvPr>
+        </p:nvSpPr>
+        <p:spPr/>
+        <p:txBody>
+          <a:bodyPr/>
+          <a:lstStyle/>
+          <a:p>
+            <a:endParaRPr lang="en-US" dirty="0"/>
+          </a:p>
+        </p:txBody>
+      </p:sp>
+      <p:sp>
+        <p:nvSpPr>
+          <p:cNvPr id="4" name="Slide Number Placeholder 3"/>
+          <p:cNvSpPr>
+            <a:spLocks noGrp="1"/>
+          </p:cNvSpPr>
+          <p:nvPr>
+            <p:ph type="sldNum" sz="quarter" idx="5"/>
+          </p:nvPr>
+        </p:nvSpPr>
+        <p:spPr/>
+        <p:txBody>
+          <a:bodyPr/>
+          <a:lstStyle/>
+          <a:p>
+            <a:fld id="{B0C370CA-A689-E843-AD52-5ABA0D524309}" type="slidenum">
+              <a:rPr lang="en-US" smtClean="0"/>
+              <a:t>16</a:t>
+            </a:fld>
+            <a:endParaRPr lang="en-US"/>
+          </a:p>
+        </p:txBody>
+      </p:sp>
+    </p:spTree>
+    <p:extLst>
+      <p:ext uri="{BB962C8B-B14F-4D97-AF65-F5344CB8AC3E}">
+        <p14:creationId xmlns:p14="http://schemas.microsoft.com/office/powerpoint/2010/main" val="3016595981"/>
+      </p:ext>
+    </p:extLst>
+  </p:cSld>
+  <p:clrMapOvr>
+    <a:masterClrMapping/>
+  </p:clrMapOvr>
+</p:notes>
+</file>
+
 <file path=ppt/slideLayouts/slideLayout1.xml><?xml version="1.0" encoding="utf-8"?>
 <p:sldLayout xmlns:a="http://schemas.openxmlformats.org/drawingml/2006/main" xmlns:r="http://schemas.openxmlformats.org/officeDocument/2006/relationships" xmlns:p="http://schemas.openxmlformats.org/presentationml/2006/main" type="title" preserve="1">
   <p:cSld name="Title Slide">
@@ -967,7 +1143,7 @@
           <a:p>
             <a:fld id="{D6923246-0C62-5D41-B9C6-91073FF18CCD}" type="datetimeFigureOut">
               <a:rPr lang="en-US" smtClean="0"/>
-              <a:t>6/13/23</a:t>
+              <a:t>6/13/2023</a:t>
             </a:fld>
             <a:endParaRPr lang="en-US"/>
           </a:p>
@@ -1167,7 +1343,7 @@
           <a:p>
             <a:fld id="{D6923246-0C62-5D41-B9C6-91073FF18CCD}" type="datetimeFigureOut">
               <a:rPr lang="en-US" smtClean="0"/>
-              <a:t>6/13/23</a:t>
+              <a:t>6/13/2023</a:t>
             </a:fld>
             <a:endParaRPr lang="en-US"/>
           </a:p>
@@ -1377,7 +1553,7 @@
           <a:p>
             <a:fld id="{D6923246-0C62-5D41-B9C6-91073FF18CCD}" type="datetimeFigureOut">
               <a:rPr lang="en-US" smtClean="0"/>
-              <a:t>6/13/23</a:t>
+              <a:t>6/13/2023</a:t>
             </a:fld>
             <a:endParaRPr lang="en-US"/>
           </a:p>
@@ -1577,7 +1753,7 @@
           <a:p>
             <a:fld id="{D6923246-0C62-5D41-B9C6-91073FF18CCD}" type="datetimeFigureOut">
               <a:rPr lang="en-US" smtClean="0"/>
-              <a:t>6/13/23</a:t>
+              <a:t>6/13/2023</a:t>
             </a:fld>
             <a:endParaRPr lang="en-US"/>
           </a:p>
@@ -1853,7 +2029,7 @@
           <a:p>
             <a:fld id="{D6923246-0C62-5D41-B9C6-91073FF18CCD}" type="datetimeFigureOut">
               <a:rPr lang="en-US" smtClean="0"/>
-              <a:t>6/13/23</a:t>
+              <a:t>6/13/2023</a:t>
             </a:fld>
             <a:endParaRPr lang="en-US"/>
           </a:p>
@@ -2121,7 +2297,7 @@
           <a:p>
             <a:fld id="{D6923246-0C62-5D41-B9C6-91073FF18CCD}" type="datetimeFigureOut">
               <a:rPr lang="en-US" smtClean="0"/>
-              <a:t>6/13/23</a:t>
+              <a:t>6/13/2023</a:t>
             </a:fld>
             <a:endParaRPr lang="en-US"/>
           </a:p>
@@ -2536,7 +2712,7 @@
           <a:p>
             <a:fld id="{D6923246-0C62-5D41-B9C6-91073FF18CCD}" type="datetimeFigureOut">
               <a:rPr lang="en-US" smtClean="0"/>
-              <a:t>6/13/23</a:t>
+              <a:t>6/13/2023</a:t>
             </a:fld>
             <a:endParaRPr lang="en-US"/>
           </a:p>
@@ -2678,7 +2854,7 @@
           <a:p>
             <a:fld id="{D6923246-0C62-5D41-B9C6-91073FF18CCD}" type="datetimeFigureOut">
               <a:rPr lang="en-US" smtClean="0"/>
-              <a:t>6/13/23</a:t>
+              <a:t>6/13/2023</a:t>
             </a:fld>
             <a:endParaRPr lang="en-US"/>
           </a:p>
@@ -2791,7 +2967,7 @@
           <a:p>
             <a:fld id="{D6923246-0C62-5D41-B9C6-91073FF18CCD}" type="datetimeFigureOut">
               <a:rPr lang="en-US" smtClean="0"/>
-              <a:t>6/13/23</a:t>
+              <a:t>6/13/2023</a:t>
             </a:fld>
             <a:endParaRPr lang="en-US"/>
           </a:p>
@@ -3104,7 +3280,7 @@
           <a:p>
             <a:fld id="{D6923246-0C62-5D41-B9C6-91073FF18CCD}" type="datetimeFigureOut">
               <a:rPr lang="en-US" smtClean="0"/>
-              <a:t>6/13/23</a:t>
+              <a:t>6/13/2023</a:t>
             </a:fld>
             <a:endParaRPr lang="en-US"/>
           </a:p>
@@ -3393,7 +3569,7 @@
           <a:p>
             <a:fld id="{D6923246-0C62-5D41-B9C6-91073FF18CCD}" type="datetimeFigureOut">
               <a:rPr lang="en-US" smtClean="0"/>
-              <a:t>6/13/23</a:t>
+              <a:t>6/13/2023</a:t>
             </a:fld>
             <a:endParaRPr lang="en-US"/>
           </a:p>
@@ -3636,7 +3812,7 @@
           <a:p>
             <a:fld id="{D6923246-0C62-5D41-B9C6-91073FF18CCD}" type="datetimeFigureOut">
               <a:rPr lang="en-US" smtClean="0"/>
-              <a:t>6/13/23</a:t>
+              <a:t>6/13/2023</a:t>
             </a:fld>
             <a:endParaRPr lang="en-US"/>
           </a:p>
@@ -5539,10 +5715,10 @@
       </p:sp>
       <p:pic>
         <p:nvPicPr>
-          <p:cNvPr id="6" name="Picture 5">
-            <a:extLst>
-              <a:ext uri="{FF2B5EF4-FFF2-40B4-BE49-F238E27FC236}">
-                <a16:creationId xmlns:a16="http://schemas.microsoft.com/office/drawing/2014/main" id="{EEAA6E70-1D92-36AE-9BAA-BB5580A197BF}"/>
+          <p:cNvPr id="5" name="Picture 4">
+            <a:extLst>
+              <a:ext uri="{FF2B5EF4-FFF2-40B4-BE49-F238E27FC236}">
+                <a16:creationId xmlns:a16="http://schemas.microsoft.com/office/drawing/2014/main" id="{232685E6-A9AC-3F92-70D4-EA0195F3EE3E}"/>
               </a:ext>
             </a:extLst>
           </p:cNvPr>
@@ -5553,22 +5729,18 @@
         </p:nvPicPr>
         <p:blipFill>
           <a:blip r:embed="rId3"/>
-          <a:srcRect t="7814" b="7814"/>
-          <a:stretch/>
+          <a:stretch>
+            <a:fillRect/>
+          </a:stretch>
         </p:blipFill>
         <p:spPr>
           <a:xfrm>
-            <a:off x="239537" y="978706"/>
-            <a:ext cx="11745058" cy="5530582"/>
-          </a:xfrm>
-          <a:prstGeom prst="rect">
-            <a:avLst/>
-          </a:prstGeom>
-          <a:ln>
-            <a:solidFill>
-              <a:schemeClr val="tx1"/>
-            </a:solidFill>
-          </a:ln>
+            <a:off x="1752377" y="942847"/>
+            <a:ext cx="8687246" cy="4972306"/>
+          </a:xfrm>
+          <a:prstGeom prst="rect">
+            <a:avLst/>
+          </a:prstGeom>
         </p:spPr>
       </p:pic>
     </p:spTree>
@@ -5741,10 +5913,10 @@
       </p:sp>
       <p:pic>
         <p:nvPicPr>
-          <p:cNvPr id="6" name="Picture 5">
-            <a:extLst>
-              <a:ext uri="{FF2B5EF4-FFF2-40B4-BE49-F238E27FC236}">
-                <a16:creationId xmlns:a16="http://schemas.microsoft.com/office/drawing/2014/main" id="{EEAA6E70-1D92-36AE-9BAA-BB5580A197BF}"/>
+          <p:cNvPr id="5" name="Picture 4">
+            <a:extLst>
+              <a:ext uri="{FF2B5EF4-FFF2-40B4-BE49-F238E27FC236}">
+                <a16:creationId xmlns:a16="http://schemas.microsoft.com/office/drawing/2014/main" id="{27956B32-8098-1A84-5E43-C5CFCD3C8F6B}"/>
               </a:ext>
             </a:extLst>
           </p:cNvPr>
@@ -5755,22 +5927,18 @@
         </p:nvPicPr>
         <p:blipFill>
           <a:blip r:embed="rId4"/>
-          <a:srcRect t="6343" b="6343"/>
-          <a:stretch/>
+          <a:stretch>
+            <a:fillRect/>
+          </a:stretch>
         </p:blipFill>
         <p:spPr>
           <a:xfrm>
-            <a:off x="239537" y="978706"/>
-            <a:ext cx="11745058" cy="5530582"/>
-          </a:xfrm>
-          <a:prstGeom prst="rect">
-            <a:avLst/>
-          </a:prstGeom>
-          <a:ln>
-            <a:solidFill>
-              <a:schemeClr val="tx1"/>
-            </a:solidFill>
-          </a:ln>
+            <a:off x="1682523" y="958723"/>
+            <a:ext cx="8826954" cy="4940554"/>
+          </a:xfrm>
+          <a:prstGeom prst="rect">
+            <a:avLst/>
+          </a:prstGeom>
         </p:spPr>
       </p:pic>
     </p:spTree>
@@ -5818,7 +5986,7 @@
           <p:nvPr/>
         </p:nvPicPr>
         <p:blipFill rotWithShape="1">
-          <a:blip r:embed="rId2">
+          <a:blip r:embed="rId3">
             <a:extLst>
               <a:ext uri="{28A0092B-C50C-407E-A947-70E740481C1C}">
                 <a14:useLocalDpi xmlns:a14="http://schemas.microsoft.com/office/drawing/2010/main" val="0"/>
@@ -5850,10 +6018,10 @@
       </p:pic>
       <p:pic>
         <p:nvPicPr>
-          <p:cNvPr id="2" name="Picture 2" descr="The story of the NBA logo | Logo Design Love">
-            <a:extLst>
-              <a:ext uri="{FF2B5EF4-FFF2-40B4-BE49-F238E27FC236}">
-                <a16:creationId xmlns:a16="http://schemas.microsoft.com/office/drawing/2014/main" id="{7794069E-ADE1-D1DD-8EC7-9056B6948FDB}"/>
+          <p:cNvPr id="4" name="Picture 2" descr="The story of the NBA logo | Logo Design Love">
+            <a:extLst>
+              <a:ext uri="{FF2B5EF4-FFF2-40B4-BE49-F238E27FC236}">
+                <a16:creationId xmlns:a16="http://schemas.microsoft.com/office/drawing/2014/main" id="{66C32491-2C3E-12EE-1B41-8ED39050355E}"/>
               </a:ext>
             </a:extLst>
           </p:cNvPr>
@@ -5863,20 +6031,20 @@
           <p:nvPr/>
         </p:nvPicPr>
         <p:blipFill rotWithShape="1">
-          <a:blip r:embed="rId2">
+          <a:blip r:embed="rId3">
             <a:extLst>
               <a:ext uri="{28A0092B-C50C-407E-A947-70E740481C1C}">
                 <a14:useLocalDpi xmlns:a14="http://schemas.microsoft.com/office/drawing/2010/main" val="0"/>
               </a:ext>
             </a:extLst>
           </a:blip>
-          <a:srcRect l="55102" t="15069" r="41457" b="75764"/>
+          <a:srcRect l="25261" r="64238"/>
           <a:stretch/>
         </p:blipFill>
         <p:spPr bwMode="auto">
           <a:xfrm>
-            <a:off x="-1" y="0"/>
-            <a:ext cx="11616423" cy="871537"/>
+            <a:off x="0" y="0"/>
+            <a:ext cx="11616422" cy="871537"/>
           </a:xfrm>
           <a:prstGeom prst="rect">
             <a:avLst/>
@@ -5895,10 +6063,10 @@
       </p:pic>
       <p:sp>
         <p:nvSpPr>
-          <p:cNvPr id="3" name="TextBox 2">
-            <a:extLst>
-              <a:ext uri="{FF2B5EF4-FFF2-40B4-BE49-F238E27FC236}">
-                <a16:creationId xmlns:a16="http://schemas.microsoft.com/office/drawing/2014/main" id="{8566DA64-D9A8-F501-C7CD-97C7D2C83100}"/>
+          <p:cNvPr id="2" name="TextBox 1">
+            <a:extLst>
+              <a:ext uri="{FF2B5EF4-FFF2-40B4-BE49-F238E27FC236}">
+                <a16:creationId xmlns:a16="http://schemas.microsoft.com/office/drawing/2014/main" id="{DC32C837-27EB-8654-3685-5DF85A1D0AF6}"/>
               </a:ext>
             </a:extLst>
           </p:cNvPr>
@@ -5908,7 +6076,7 @@
         <p:spPr>
           <a:xfrm>
             <a:off x="95693" y="107169"/>
-            <a:ext cx="5486401" cy="523220"/>
+            <a:ext cx="9911907" cy="523220"/>
           </a:xfrm>
           <a:prstGeom prst="rect">
             <a:avLst/>
@@ -5930,7 +6098,18 @@
                 <a:latin typeface="Calibri" panose="020F0502020204030204" pitchFamily="34" charset="0"/>
                 <a:cs typeface="Calibri" panose="020F0502020204030204" pitchFamily="34" charset="0"/>
               </a:rPr>
-              <a:t>CHALLENGES</a:t>
+              <a:t>TABLEAU DASHBOARD </a:t>
+            </a:r>
+            <a:r>
+              <a:rPr lang="en-IN" sz="2800" b="0" i="0">
+                <a:solidFill>
+                  <a:schemeClr val="bg1"/>
+                </a:solidFill>
+                <a:effectLst/>
+                <a:latin typeface="Calibri" panose="020F0502020204030204" pitchFamily="34" charset="0"/>
+                <a:cs typeface="Calibri" panose="020F0502020204030204" pitchFamily="34" charset="0"/>
+              </a:rPr>
+              <a:t>– PLAYER COMPARISION</a:t>
             </a:r>
             <a:endParaRPr lang="en-IN" sz="2800" dirty="0">
               <a:solidFill>
@@ -5941,134 +6120,40 @@
           </a:p>
         </p:txBody>
       </p:sp>
-      <p:sp>
-        <p:nvSpPr>
-          <p:cNvPr id="4" name="TextBox 3">
-            <a:extLst>
-              <a:ext uri="{FF2B5EF4-FFF2-40B4-BE49-F238E27FC236}">
-                <a16:creationId xmlns:a16="http://schemas.microsoft.com/office/drawing/2014/main" id="{69AD936E-0E62-D7D8-3B9A-DBAF20CCB759}"/>
-              </a:ext>
-            </a:extLst>
-          </p:cNvPr>
-          <p:cNvSpPr txBox="1"/>
+      <p:pic>
+        <p:nvPicPr>
+          <p:cNvPr id="5" name="Picture 4">
+            <a:extLst>
+              <a:ext uri="{FF2B5EF4-FFF2-40B4-BE49-F238E27FC236}">
+                <a16:creationId xmlns:a16="http://schemas.microsoft.com/office/drawing/2014/main" id="{C02216F5-DE72-ACF7-9DD3-0923450AC648}"/>
+              </a:ext>
+            </a:extLst>
+          </p:cNvPr>
+          <p:cNvPicPr>
+            <a:picLocks noChangeAspect="1"/>
+          </p:cNvPicPr>
           <p:nvPr/>
-        </p:nvSpPr>
+        </p:nvPicPr>
+        <p:blipFill>
+          <a:blip r:embed="rId4"/>
+          <a:stretch>
+            <a:fillRect/>
+          </a:stretch>
+        </p:blipFill>
         <p:spPr>
           <a:xfrm>
-            <a:off x="0" y="1237240"/>
-            <a:ext cx="12192000" cy="3970318"/>
-          </a:xfrm>
-          <a:prstGeom prst="rect">
-            <a:avLst/>
-          </a:prstGeom>
-          <a:noFill/>
-          <a:ln>
-            <a:solidFill>
-              <a:schemeClr val="tx1"/>
-            </a:solidFill>
-          </a:ln>
-        </p:spPr>
-        <p:txBody>
-          <a:bodyPr wrap="square" rtlCol="0">
-            <a:spAutoFit/>
-          </a:bodyPr>
-          <a:lstStyle/>
-          <a:p>
-            <a:pPr algn="l"/>
-            <a:endParaRPr lang="en-IN" b="0" i="0" u="none" strike="noStrike" dirty="0">
-              <a:solidFill>
-                <a:srgbClr val="1F2328"/>
-              </a:solidFill>
-              <a:effectLst/>
-              <a:latin typeface="-apple-system"/>
-            </a:endParaRPr>
-          </a:p>
-          <a:p>
-            <a:pPr algn="l">
-              <a:buFont typeface="Arial" panose="020B0604020202020204" pitchFamily="34" charset="0"/>
-              <a:buChar char="•"/>
-            </a:pPr>
-            <a:r>
-              <a:rPr lang="en-IN" b="0" i="0" u="none" strike="noStrike" dirty="0">
-                <a:solidFill>
-                  <a:srgbClr val="1F2328"/>
-                </a:solidFill>
-                <a:effectLst/>
-                <a:latin typeface="-apple-system"/>
-              </a:rPr>
-              <a:t> Bad Encoding: The original data had encoding issues that we struggled to handle. We had to apply encoding techniques to ensure proper handling and interpretation of the data.</a:t>
-            </a:r>
-          </a:p>
-          <a:p>
-            <a:pPr algn="l"/>
-            <a:endParaRPr lang="en-IN" b="0" i="0" u="none" strike="noStrike" dirty="0">
-              <a:solidFill>
-                <a:srgbClr val="1F2328"/>
-              </a:solidFill>
-              <a:effectLst/>
-              <a:latin typeface="-apple-system"/>
-            </a:endParaRPr>
-          </a:p>
-          <a:p>
-            <a:pPr algn="l">
-              <a:buFont typeface="Arial" panose="020B0604020202020204" pitchFamily="34" charset="0"/>
-              <a:buChar char="•"/>
-            </a:pPr>
-            <a:r>
-              <a:rPr lang="en-IN" b="0" i="0" u="none" strike="noStrike" dirty="0">
-                <a:solidFill>
-                  <a:srgbClr val="1F2328"/>
-                </a:solidFill>
-                <a:effectLst/>
-                <a:latin typeface="-apple-system"/>
-              </a:rPr>
-              <a:t> External Factors: While player statistics provide valuable insights, it's important to note that other factors can influence a player's performance on the court. Factors such as injuries, team dynamics, coaching strategies, and external circumstances were not included in our analysis. Considering these external factors could further enhance the accuracy and predictive power of the model.</a:t>
-            </a:r>
-          </a:p>
-          <a:p>
-            <a:pPr algn="l"/>
-            <a:endParaRPr lang="en-IN" b="0" i="0" u="none" strike="noStrike" dirty="0">
-              <a:solidFill>
-                <a:srgbClr val="1F2328"/>
-              </a:solidFill>
-              <a:effectLst/>
-              <a:latin typeface="-apple-system"/>
-            </a:endParaRPr>
-          </a:p>
-          <a:p>
-            <a:pPr algn="l">
-              <a:buFont typeface="Arial" panose="020B0604020202020204" pitchFamily="34" charset="0"/>
-              <a:buChar char="•"/>
-            </a:pPr>
-            <a:r>
-              <a:rPr lang="en-IN" dirty="0">
-                <a:solidFill>
-                  <a:srgbClr val="1F2328"/>
-                </a:solidFill>
-                <a:latin typeface="-apple-system"/>
-              </a:rPr>
-              <a:t>Outliers: </a:t>
-            </a:r>
-            <a:r>
-              <a:rPr lang="en-IN" b="0" i="0" u="none" strike="noStrike" dirty="0">
-                <a:solidFill>
-                  <a:srgbClr val="1F2328"/>
-                </a:solidFill>
-                <a:effectLst/>
-                <a:latin typeface="-apple-system"/>
-              </a:rPr>
-              <a:t>To handle these outliers, we implemented a post-processing step where we replaced any negative predicted values with zeros. This approach allowed us to address the outliers and ensure that the predicted statistics remain within a valid range. By zeroing out the negative values, we mitigated the impact of outliers on the model's performance and ensured that the predicted player statistics align with the expectations of NBA player performance.</a:t>
-            </a:r>
-          </a:p>
-          <a:p>
-            <a:endParaRPr lang="en-US" dirty="0"/>
-          </a:p>
-        </p:txBody>
-      </p:sp>
+            <a:off x="1666647" y="920621"/>
+            <a:ext cx="8858705" cy="5016758"/>
+          </a:xfrm>
+          <a:prstGeom prst="rect">
+            <a:avLst/>
+          </a:prstGeom>
+        </p:spPr>
+      </p:pic>
     </p:spTree>
     <p:extLst>
       <p:ext uri="{BB962C8B-B14F-4D97-AF65-F5344CB8AC3E}">
-        <p14:creationId xmlns:p14="http://schemas.microsoft.com/office/powerpoint/2010/main" val="3175716620"/>
+        <p14:creationId xmlns:p14="http://schemas.microsoft.com/office/powerpoint/2010/main" val="2356194855"/>
       </p:ext>
     </p:extLst>
   </p:cSld>
@@ -6142,6 +6227,298 @@
       </p:pic>
       <p:pic>
         <p:nvPicPr>
+          <p:cNvPr id="2" name="Picture 2" descr="The story of the NBA logo | Logo Design Love">
+            <a:extLst>
+              <a:ext uri="{FF2B5EF4-FFF2-40B4-BE49-F238E27FC236}">
+                <a16:creationId xmlns:a16="http://schemas.microsoft.com/office/drawing/2014/main" id="{7794069E-ADE1-D1DD-8EC7-9056B6948FDB}"/>
+              </a:ext>
+            </a:extLst>
+          </p:cNvPr>
+          <p:cNvPicPr>
+            <a:picLocks noChangeAspect="1" noChangeArrowheads="1"/>
+          </p:cNvPicPr>
+          <p:nvPr/>
+        </p:nvPicPr>
+        <p:blipFill rotWithShape="1">
+          <a:blip r:embed="rId2">
+            <a:extLst>
+              <a:ext uri="{28A0092B-C50C-407E-A947-70E740481C1C}">
+                <a14:useLocalDpi xmlns:a14="http://schemas.microsoft.com/office/drawing/2010/main" val="0"/>
+              </a:ext>
+            </a:extLst>
+          </a:blip>
+          <a:srcRect l="55102" t="15069" r="41457" b="75764"/>
+          <a:stretch/>
+        </p:blipFill>
+        <p:spPr bwMode="auto">
+          <a:xfrm>
+            <a:off x="-1" y="0"/>
+            <a:ext cx="11616423" cy="871537"/>
+          </a:xfrm>
+          <a:prstGeom prst="rect">
+            <a:avLst/>
+          </a:prstGeom>
+          <a:noFill/>
+          <a:extLst>
+            <a:ext uri="{909E8E84-426E-40DD-AFC4-6F175D3DCCD1}">
+              <a14:hiddenFill xmlns:a14="http://schemas.microsoft.com/office/drawing/2010/main">
+                <a:solidFill>
+                  <a:srgbClr val="FFFFFF"/>
+                </a:solidFill>
+              </a14:hiddenFill>
+            </a:ext>
+          </a:extLst>
+        </p:spPr>
+      </p:pic>
+      <p:sp>
+        <p:nvSpPr>
+          <p:cNvPr id="3" name="TextBox 2">
+            <a:extLst>
+              <a:ext uri="{FF2B5EF4-FFF2-40B4-BE49-F238E27FC236}">
+                <a16:creationId xmlns:a16="http://schemas.microsoft.com/office/drawing/2014/main" id="{8566DA64-D9A8-F501-C7CD-97C7D2C83100}"/>
+              </a:ext>
+            </a:extLst>
+          </p:cNvPr>
+          <p:cNvSpPr txBox="1"/>
+          <p:nvPr/>
+        </p:nvSpPr>
+        <p:spPr>
+          <a:xfrm>
+            <a:off x="95693" y="107169"/>
+            <a:ext cx="5486401" cy="523220"/>
+          </a:xfrm>
+          <a:prstGeom prst="rect">
+            <a:avLst/>
+          </a:prstGeom>
+          <a:noFill/>
+        </p:spPr>
+        <p:txBody>
+          <a:bodyPr wrap="square" rtlCol="0">
+            <a:spAutoFit/>
+          </a:bodyPr>
+          <a:lstStyle/>
+          <a:p>
+            <a:r>
+              <a:rPr lang="en-IN" sz="2800" b="0" i="0" dirty="0">
+                <a:solidFill>
+                  <a:schemeClr val="bg1"/>
+                </a:solidFill>
+                <a:effectLst/>
+                <a:latin typeface="Calibri" panose="020F0502020204030204" pitchFamily="34" charset="0"/>
+                <a:cs typeface="Calibri" panose="020F0502020204030204" pitchFamily="34" charset="0"/>
+              </a:rPr>
+              <a:t>CHALLENGES</a:t>
+            </a:r>
+            <a:endParaRPr lang="en-IN" sz="2800" dirty="0">
+              <a:solidFill>
+                <a:schemeClr val="bg1"/>
+              </a:solidFill>
+              <a:latin typeface="Tableau Book"/>
+            </a:endParaRPr>
+          </a:p>
+        </p:txBody>
+      </p:sp>
+      <p:sp>
+        <p:nvSpPr>
+          <p:cNvPr id="4" name="TextBox 3">
+            <a:extLst>
+              <a:ext uri="{FF2B5EF4-FFF2-40B4-BE49-F238E27FC236}">
+                <a16:creationId xmlns:a16="http://schemas.microsoft.com/office/drawing/2014/main" id="{69AD936E-0E62-D7D8-3B9A-DBAF20CCB759}"/>
+              </a:ext>
+            </a:extLst>
+          </p:cNvPr>
+          <p:cNvSpPr txBox="1"/>
+          <p:nvPr/>
+        </p:nvSpPr>
+        <p:spPr>
+          <a:xfrm>
+            <a:off x="0" y="1237240"/>
+            <a:ext cx="12192000" cy="3970318"/>
+          </a:xfrm>
+          <a:prstGeom prst="rect">
+            <a:avLst/>
+          </a:prstGeom>
+          <a:noFill/>
+          <a:ln>
+            <a:solidFill>
+              <a:schemeClr val="tx1"/>
+            </a:solidFill>
+          </a:ln>
+        </p:spPr>
+        <p:txBody>
+          <a:bodyPr wrap="square" rtlCol="0">
+            <a:spAutoFit/>
+          </a:bodyPr>
+          <a:lstStyle/>
+          <a:p>
+            <a:pPr algn="l"/>
+            <a:endParaRPr lang="en-IN" b="0" i="0" u="none" strike="noStrike" dirty="0">
+              <a:solidFill>
+                <a:srgbClr val="1F2328"/>
+              </a:solidFill>
+              <a:effectLst/>
+              <a:latin typeface="-apple-system"/>
+            </a:endParaRPr>
+          </a:p>
+          <a:p>
+            <a:pPr algn="l">
+              <a:buFont typeface="Arial" panose="020B0604020202020204" pitchFamily="34" charset="0"/>
+              <a:buChar char="•"/>
+            </a:pPr>
+            <a:r>
+              <a:rPr lang="en-IN" b="0" i="0" u="none" strike="noStrike" dirty="0">
+                <a:solidFill>
+                  <a:srgbClr val="1F2328"/>
+                </a:solidFill>
+                <a:effectLst/>
+                <a:latin typeface="-apple-system"/>
+              </a:rPr>
+              <a:t> Bad Encoding: The original data had encoding issues that we struggled to handle. We had to apply encoding techniques to ensure proper handling and interpretation of the data.</a:t>
+            </a:r>
+          </a:p>
+          <a:p>
+            <a:pPr algn="l"/>
+            <a:endParaRPr lang="en-IN" b="0" i="0" u="none" strike="noStrike" dirty="0">
+              <a:solidFill>
+                <a:srgbClr val="1F2328"/>
+              </a:solidFill>
+              <a:effectLst/>
+              <a:latin typeface="-apple-system"/>
+            </a:endParaRPr>
+          </a:p>
+          <a:p>
+            <a:pPr algn="l">
+              <a:buFont typeface="Arial" panose="020B0604020202020204" pitchFamily="34" charset="0"/>
+              <a:buChar char="•"/>
+            </a:pPr>
+            <a:r>
+              <a:rPr lang="en-IN" b="0" i="0" u="none" strike="noStrike" dirty="0">
+                <a:solidFill>
+                  <a:srgbClr val="1F2328"/>
+                </a:solidFill>
+                <a:effectLst/>
+                <a:latin typeface="-apple-system"/>
+              </a:rPr>
+              <a:t> External Factors: While player statistics provide valuable insights, it's important to note that other factors can influence a player's performance on the court. Factors such as injuries, team dynamics, coaching strategies, and external circumstances were not included in our analysis. Considering these external factors could further enhance the accuracy and predictive power of the model.</a:t>
+            </a:r>
+          </a:p>
+          <a:p>
+            <a:pPr algn="l"/>
+            <a:endParaRPr lang="en-IN" b="0" i="0" u="none" strike="noStrike" dirty="0">
+              <a:solidFill>
+                <a:srgbClr val="1F2328"/>
+              </a:solidFill>
+              <a:effectLst/>
+              <a:latin typeface="-apple-system"/>
+            </a:endParaRPr>
+          </a:p>
+          <a:p>
+            <a:pPr algn="l">
+              <a:buFont typeface="Arial" panose="020B0604020202020204" pitchFamily="34" charset="0"/>
+              <a:buChar char="•"/>
+            </a:pPr>
+            <a:r>
+              <a:rPr lang="en-IN" dirty="0">
+                <a:solidFill>
+                  <a:srgbClr val="1F2328"/>
+                </a:solidFill>
+                <a:latin typeface="-apple-system"/>
+              </a:rPr>
+              <a:t>Outliers: </a:t>
+            </a:r>
+            <a:r>
+              <a:rPr lang="en-IN" b="0" i="0" u="none" strike="noStrike" dirty="0">
+                <a:solidFill>
+                  <a:srgbClr val="1F2328"/>
+                </a:solidFill>
+                <a:effectLst/>
+                <a:latin typeface="-apple-system"/>
+              </a:rPr>
+              <a:t>To handle these outliers, we implemented a post-processing step where we replaced any negative predicted values with zeros. This approach allowed us to address the outliers and ensure that the predicted statistics remain within a valid range. By zeroing out the negative values, we mitigated the impact of outliers on the model's performance and ensured that the predicted player statistics align with the expectations of NBA player performance.</a:t>
+            </a:r>
+          </a:p>
+          <a:p>
+            <a:endParaRPr lang="en-US" dirty="0"/>
+          </a:p>
+        </p:txBody>
+      </p:sp>
+    </p:spTree>
+    <p:extLst>
+      <p:ext uri="{BB962C8B-B14F-4D97-AF65-F5344CB8AC3E}">
+        <p14:creationId xmlns:p14="http://schemas.microsoft.com/office/powerpoint/2010/main" val="3175716620"/>
+      </p:ext>
+    </p:extLst>
+  </p:cSld>
+  <p:clrMapOvr>
+    <a:masterClrMapping/>
+  </p:clrMapOvr>
+</p:sld>
+</file>
+
+<file path=ppt/slides/slide18.xml><?xml version="1.0" encoding="utf-8"?>
+<p:sld xmlns:a="http://schemas.openxmlformats.org/drawingml/2006/main" xmlns:r="http://schemas.openxmlformats.org/officeDocument/2006/relationships" xmlns:p="http://schemas.openxmlformats.org/presentationml/2006/main">
+  <p:cSld>
+    <p:spTree>
+      <p:nvGrpSpPr>
+        <p:cNvPr id="1" name=""/>
+        <p:cNvGrpSpPr/>
+        <p:nvPr/>
+      </p:nvGrpSpPr>
+      <p:grpSpPr>
+        <a:xfrm>
+          <a:off x="0" y="0"/>
+          <a:ext cx="0" cy="0"/>
+          <a:chOff x="0" y="0"/>
+          <a:chExt cx="0" cy="0"/>
+        </a:xfrm>
+      </p:grpSpPr>
+      <p:pic>
+        <p:nvPicPr>
+          <p:cNvPr id="1026" name="Picture 2" descr="The story of the NBA logo | Logo Design Love">
+            <a:extLst>
+              <a:ext uri="{FF2B5EF4-FFF2-40B4-BE49-F238E27FC236}">
+                <a16:creationId xmlns:a16="http://schemas.microsoft.com/office/drawing/2014/main" id="{47D7BF37-A138-073B-C7CE-EE7CC763D407}"/>
+              </a:ext>
+            </a:extLst>
+          </p:cNvPr>
+          <p:cNvPicPr>
+            <a:picLocks noChangeAspect="1" noChangeArrowheads="1"/>
+          </p:cNvPicPr>
+          <p:nvPr/>
+        </p:nvPicPr>
+        <p:blipFill rotWithShape="1">
+          <a:blip r:embed="rId2">
+            <a:extLst>
+              <a:ext uri="{28A0092B-C50C-407E-A947-70E740481C1C}">
+                <a14:useLocalDpi xmlns:a14="http://schemas.microsoft.com/office/drawing/2010/main" val="0"/>
+              </a:ext>
+            </a:extLst>
+          </a:blip>
+          <a:srcRect l="25261" r="25207"/>
+          <a:stretch/>
+        </p:blipFill>
+        <p:spPr bwMode="auto">
+          <a:xfrm>
+            <a:off x="11616422" y="1"/>
+            <a:ext cx="575578" cy="871537"/>
+          </a:xfrm>
+          <a:prstGeom prst="rect">
+            <a:avLst/>
+          </a:prstGeom>
+          <a:noFill/>
+          <a:extLst>
+            <a:ext uri="{909E8E84-426E-40DD-AFC4-6F175D3DCCD1}">
+              <a14:hiddenFill xmlns:a14="http://schemas.microsoft.com/office/drawing/2010/main">
+                <a:solidFill>
+                  <a:srgbClr val="FFFFFF"/>
+                </a:solidFill>
+              </a14:hiddenFill>
+            </a:ext>
+          </a:extLst>
+        </p:spPr>
+      </p:pic>
+      <p:pic>
+        <p:nvPicPr>
           <p:cNvPr id="4" name="Picture 2" descr="The story of the NBA logo | Logo Design Love">
             <a:extLst>
               <a:ext uri="{FF2B5EF4-FFF2-40B4-BE49-F238E27FC236}">
@@ -6347,7 +6724,7 @@
 </p:sld>
 </file>
 
-<file path=ppt/slides/slide18.xml><?xml version="1.0" encoding="utf-8"?>
+<file path=ppt/slides/slide19.xml><?xml version="1.0" encoding="utf-8"?>
 <p:sld xmlns:a="http://schemas.openxmlformats.org/drawingml/2006/main" xmlns:r="http://schemas.openxmlformats.org/officeDocument/2006/relationships" xmlns:p="http://schemas.openxmlformats.org/presentationml/2006/main">
   <p:cSld>
     <p:spTree>

</xml_diff>